<commit_message>
Actualizado documentación y power point a corregir errores no me ha dado tiempo hoy
</commit_message>
<xml_diff>
--- a/Documentation/Presentacion.pptx
+++ b/Documentation/Presentacion.pptx
@@ -113,6 +113,11 @@
       </a:defRPr>
     </a:lvl9pPr>
   </p:defaultTextStyle>
+  <p:extLst>
+    <p:ext uri="{EFAFB233-063F-42B5-8137-9DF3F51BA10A}">
+      <p15:sldGuideLst xmlns:p15="http://schemas.microsoft.com/office/powerpoint/2012/main"/>
+    </p:ext>
+  </p:extLst>
 </p:presentation>
 </file>
 
@@ -198,7 +203,7 @@
           <a:p>
             <a:fld id="{579B37E6-1397-4C01-8E56-80869D2B8F42}" type="datetimeFigureOut">
               <a:rPr lang="es-ES" smtClean="0"/>
-              <a:t>24/02/2025</a:t>
+              <a:t>28/02/2025</a:t>
             </a:fld>
             <a:endParaRPr lang="es-ES"/>
           </a:p>
@@ -717,7 +722,7 @@
           <a:p>
             <a:fld id="{E6EB9540-8C52-45CA-9CE4-216C1D92EE67}" type="datetimeFigureOut">
               <a:rPr lang="es-ES" smtClean="0"/>
-              <a:t>24/02/2025</a:t>
+              <a:t>28/02/2025</a:t>
             </a:fld>
             <a:endParaRPr lang="es-ES"/>
           </a:p>
@@ -945,7 +950,7 @@
           <a:p>
             <a:fld id="{E6EB9540-8C52-45CA-9CE4-216C1D92EE67}" type="datetimeFigureOut">
               <a:rPr lang="es-ES" smtClean="0"/>
-              <a:t>24/02/2025</a:t>
+              <a:t>28/02/2025</a:t>
             </a:fld>
             <a:endParaRPr lang="es-ES"/>
           </a:p>
@@ -1125,7 +1130,7 @@
           <a:p>
             <a:fld id="{E6EB9540-8C52-45CA-9CE4-216C1D92EE67}" type="datetimeFigureOut">
               <a:rPr lang="es-ES" smtClean="0"/>
-              <a:t>24/02/2025</a:t>
+              <a:t>28/02/2025</a:t>
             </a:fld>
             <a:endParaRPr lang="es-ES"/>
           </a:p>
@@ -1295,7 +1300,7 @@
           <a:p>
             <a:fld id="{E6EB9540-8C52-45CA-9CE4-216C1D92EE67}" type="datetimeFigureOut">
               <a:rPr lang="es-ES" smtClean="0"/>
-              <a:t>24/02/2025</a:t>
+              <a:t>28/02/2025</a:t>
             </a:fld>
             <a:endParaRPr lang="es-ES"/>
           </a:p>
@@ -1549,7 +1554,7 @@
           <a:p>
             <a:fld id="{E6EB9540-8C52-45CA-9CE4-216C1D92EE67}" type="datetimeFigureOut">
               <a:rPr lang="es-ES" smtClean="0"/>
-              <a:t>24/02/2025</a:t>
+              <a:t>28/02/2025</a:t>
             </a:fld>
             <a:endParaRPr lang="es-ES"/>
           </a:p>
@@ -1875,7 +1880,7 @@
           <a:p>
             <a:fld id="{E6EB9540-8C52-45CA-9CE4-216C1D92EE67}" type="datetimeFigureOut">
               <a:rPr lang="es-ES" smtClean="0"/>
-              <a:t>24/02/2025</a:t>
+              <a:t>28/02/2025</a:t>
             </a:fld>
             <a:endParaRPr lang="es-ES"/>
           </a:p>
@@ -2326,7 +2331,7 @@
           <a:p>
             <a:fld id="{E6EB9540-8C52-45CA-9CE4-216C1D92EE67}" type="datetimeFigureOut">
               <a:rPr lang="es-ES" smtClean="0"/>
-              <a:t>24/02/2025</a:t>
+              <a:t>28/02/2025</a:t>
             </a:fld>
             <a:endParaRPr lang="es-ES"/>
           </a:p>
@@ -2444,7 +2449,7 @@
           <a:p>
             <a:fld id="{E6EB9540-8C52-45CA-9CE4-216C1D92EE67}" type="datetimeFigureOut">
               <a:rPr lang="es-ES" smtClean="0"/>
-              <a:t>24/02/2025</a:t>
+              <a:t>28/02/2025</a:t>
             </a:fld>
             <a:endParaRPr lang="es-ES"/>
           </a:p>
@@ -2539,7 +2544,7 @@
           <a:p>
             <a:fld id="{E6EB9540-8C52-45CA-9CE4-216C1D92EE67}" type="datetimeFigureOut">
               <a:rPr lang="es-ES" smtClean="0"/>
-              <a:t>24/02/2025</a:t>
+              <a:t>28/02/2025</a:t>
             </a:fld>
             <a:endParaRPr lang="es-ES"/>
           </a:p>
@@ -2826,7 +2831,7 @@
           <a:p>
             <a:fld id="{E6EB9540-8C52-45CA-9CE4-216C1D92EE67}" type="datetimeFigureOut">
               <a:rPr lang="es-ES" smtClean="0"/>
-              <a:t>24/02/2025</a:t>
+              <a:t>28/02/2025</a:t>
             </a:fld>
             <a:endParaRPr lang="es-ES"/>
           </a:p>
@@ -3148,7 +3153,7 @@
           <a:p>
             <a:fld id="{E6EB9540-8C52-45CA-9CE4-216C1D92EE67}" type="datetimeFigureOut">
               <a:rPr lang="es-ES" smtClean="0"/>
-              <a:t>24/02/2025</a:t>
+              <a:t>28/02/2025</a:t>
             </a:fld>
             <a:endParaRPr lang="es-ES"/>
           </a:p>
@@ -3402,7 +3407,7 @@
           <a:p>
             <a:fld id="{E6EB9540-8C52-45CA-9CE4-216C1D92EE67}" type="datetimeFigureOut">
               <a:rPr lang="es-ES" smtClean="0"/>
-              <a:t>24/02/2025</a:t>
+              <a:t>28/02/2025</a:t>
             </a:fld>
             <a:endParaRPr lang="es-ES"/>
           </a:p>
@@ -4329,14 +4334,16 @@
           </a:xfrm>
         </p:spPr>
         <p:txBody>
-          <a:bodyPr/>
+          <a:bodyPr>
+            <a:normAutofit/>
+          </a:bodyPr>
           <a:lstStyle/>
           <a:p>
             <a:pPr marL="0" indent="0" algn="ctr">
               <a:buNone/>
             </a:pPr>
             <a:r>
-              <a:rPr kumimoji="0" lang="es-ES" altLang="es-ES" sz="1800" b="0" i="0" u="none" strike="noStrike" cap="none" normalizeH="0" baseline="0" dirty="0">
+              <a:rPr kumimoji="0" lang="es-ES" altLang="es-ES" sz="2400" i="0" u="none" strike="noStrike" cap="none" normalizeH="0" baseline="0" dirty="0">
                 <a:ln>
                   <a:noFill/>
                 </a:ln>
@@ -4344,12 +4351,38 @@
                   <a:schemeClr val="tx1"/>
                 </a:solidFill>
                 <a:effectLst/>
+                <a:latin typeface="+mj-lt"/>
               </a:rPr>
               <a:t>Descripción general del módulo y objetivos </a:t>
             </a:r>
           </a:p>
           <a:p>
-            <a:endParaRPr lang="es-ES" dirty="0"/>
+            <a:r>
+              <a:rPr lang="es-ES" sz="1900" dirty="0"/>
+              <a:t>Modulo que integra herramientas de gestión de proyectos específicamente para industrias creativas. Diseñado con características optimas para la gestión de sus proyectos creativos y equipos de trabajo, proporcionando una interfaz intuitiva </a:t>
+            </a:r>
+          </a:p>
+          <a:p>
+            <a:endParaRPr lang="es-ES" sz="1900" dirty="0"/>
+          </a:p>
+          <a:p>
+            <a:pPr marL="0" indent="0">
+              <a:buNone/>
+            </a:pPr>
+            <a:r>
+              <a:rPr lang="es-ES" sz="1900" dirty="0"/>
+              <a:t>Tiene como objetivos principal:</a:t>
+            </a:r>
+          </a:p>
+          <a:p>
+            <a:pPr>
+              <a:buFont typeface="Arial" panose="020B0604020202020204" pitchFamily="34" charset="0"/>
+              <a:buChar char="•"/>
+            </a:pPr>
+            <a:r>
+              <a:rPr lang="es-ES" sz="1900" dirty="0"/>
+              <a:t>Ser un sistema completo de gestión de proyectos acompañado de unas herramientas de seguimiento y control para la gestión de recursos y equipos a través del análisis.</a:t>
+            </a:r>
           </a:p>
         </p:txBody>
       </p:sp>
@@ -4398,7 +4431,7 @@
         <p:spPr>
           <a:xfrm>
             <a:off x="5812347" y="772786"/>
-            <a:ext cx="5131880" cy="369332"/>
+            <a:ext cx="5131880" cy="6093976"/>
           </a:xfrm>
           <a:prstGeom prst="rect">
             <a:avLst/>
@@ -4413,7 +4446,65 @@
           <a:p>
             <a:pPr algn="ctr"/>
             <a:r>
-              <a:rPr kumimoji="0" lang="es-ES" altLang="es-ES" sz="1800" b="0" i="0" u="none" strike="noStrike" cap="none" normalizeH="0" baseline="0" dirty="0">
+              <a:rPr kumimoji="0" lang="es-ES" altLang="es-ES" sz="2400" b="0" i="0" u="none" strike="noStrike" cap="none" normalizeH="0" baseline="0" dirty="0">
+                <a:ln>
+                  <a:noFill/>
+                </a:ln>
+                <a:solidFill>
+                  <a:schemeClr val="tx1"/>
+                </a:solidFill>
+                <a:effectLst/>
+                <a:latin typeface="+mj-lt"/>
+              </a:rPr>
+              <a:t>Problemática que resuelve y valor añadido</a:t>
+            </a:r>
+          </a:p>
+          <a:p>
+            <a:pPr marL="0" marR="0" lvl="0" indent="0" algn="l" defTabSz="914400" rtl="0" eaLnBrk="0" fontAlgn="base" latinLnBrk="0" hangingPunct="0">
+              <a:lnSpc>
+                <a:spcPct val="100000"/>
+              </a:lnSpc>
+              <a:spcBef>
+                <a:spcPct val="0"/>
+              </a:spcBef>
+              <a:spcAft>
+                <a:spcPct val="0"/>
+              </a:spcAft>
+              <a:buClrTx/>
+              <a:buSzTx/>
+              <a:buFontTx/>
+              <a:buNone/>
+              <a:tabLst/>
+            </a:pPr>
+            <a:endParaRPr kumimoji="0" lang="es-ES" altLang="es-ES" sz="2000" b="0" i="0" u="none" strike="noStrike" cap="none" normalizeH="0" baseline="0" dirty="0">
+              <a:ln>
+                <a:noFill/>
+              </a:ln>
+              <a:solidFill>
+                <a:schemeClr val="tx1"/>
+              </a:solidFill>
+              <a:effectLst/>
+            </a:endParaRPr>
+          </a:p>
+          <a:p>
+            <a:pPr marL="285750" marR="0" lvl="0" indent="-285750" defTabSz="914400" rtl="0" eaLnBrk="0" fontAlgn="base" latinLnBrk="0" hangingPunct="0">
+              <a:lnSpc>
+                <a:spcPct val="100000"/>
+              </a:lnSpc>
+              <a:spcBef>
+                <a:spcPct val="0"/>
+              </a:spcBef>
+              <a:spcAft>
+                <a:spcPct val="0"/>
+              </a:spcAft>
+              <a:buClrTx/>
+              <a:buSzTx/>
+              <a:buFont typeface="Arial" panose="020B0604020202020204" pitchFamily="34" charset="0"/>
+              <a:buChar char="•"/>
+              <a:tabLst/>
+            </a:pPr>
+            <a:r>
+              <a:rPr kumimoji="0" lang="es-ES" altLang="es-ES" sz="1900" b="0" i="0" u="none" strike="noStrike" cap="none" normalizeH="0" baseline="0" dirty="0">
                 <a:ln>
                   <a:noFill/>
                 </a:ln>
@@ -4422,8 +4513,214 @@
                 </a:solidFill>
                 <a:effectLst/>
               </a:rPr>
-              <a:t>Problemática que resuelve y valor añadido </a:t>
-            </a:r>
+              <a:t>Desorganización en la gestión</a:t>
+            </a:r>
+          </a:p>
+          <a:p>
+            <a:pPr marR="0" lvl="0" defTabSz="914400" rtl="0" eaLnBrk="0" fontAlgn="base" latinLnBrk="0" hangingPunct="0">
+              <a:lnSpc>
+                <a:spcPct val="100000"/>
+              </a:lnSpc>
+              <a:spcBef>
+                <a:spcPct val="0"/>
+              </a:spcBef>
+              <a:spcAft>
+                <a:spcPct val="0"/>
+              </a:spcAft>
+              <a:buClrTx/>
+              <a:buSzTx/>
+              <a:tabLst/>
+            </a:pPr>
+            <a:endParaRPr kumimoji="0" lang="es-ES" altLang="es-ES" sz="1900" b="0" i="0" u="none" strike="noStrike" cap="none" normalizeH="0" baseline="0" dirty="0">
+              <a:ln>
+                <a:noFill/>
+              </a:ln>
+              <a:solidFill>
+                <a:schemeClr val="tx1"/>
+              </a:solidFill>
+              <a:effectLst/>
+            </a:endParaRPr>
+          </a:p>
+          <a:p>
+            <a:pPr marL="285750" marR="0" lvl="0" indent="-285750" defTabSz="914400" rtl="0" eaLnBrk="0" fontAlgn="base" latinLnBrk="0" hangingPunct="0">
+              <a:lnSpc>
+                <a:spcPct val="100000"/>
+              </a:lnSpc>
+              <a:spcBef>
+                <a:spcPct val="0"/>
+              </a:spcBef>
+              <a:spcAft>
+                <a:spcPct val="0"/>
+              </a:spcAft>
+              <a:buClrTx/>
+              <a:buSzTx/>
+              <a:buFont typeface="Arial" panose="020B0604020202020204" pitchFamily="34" charset="0"/>
+              <a:buChar char="•"/>
+              <a:tabLst/>
+            </a:pPr>
+            <a:r>
+              <a:rPr kumimoji="0" lang="es-ES" altLang="es-ES" sz="1900" b="0" i="0" u="none" strike="noStrike" cap="none" normalizeH="0" baseline="0" dirty="0">
+                <a:ln>
+                  <a:noFill/>
+                </a:ln>
+                <a:solidFill>
+                  <a:schemeClr val="tx1"/>
+                </a:solidFill>
+                <a:effectLst/>
+              </a:rPr>
+              <a:t>Ineficiencia en la asignación de recursos</a:t>
+            </a:r>
+          </a:p>
+          <a:p>
+            <a:pPr marR="0" lvl="0" defTabSz="914400" rtl="0" eaLnBrk="0" fontAlgn="base" latinLnBrk="0" hangingPunct="0">
+              <a:lnSpc>
+                <a:spcPct val="100000"/>
+              </a:lnSpc>
+              <a:spcBef>
+                <a:spcPct val="0"/>
+              </a:spcBef>
+              <a:spcAft>
+                <a:spcPct val="0"/>
+              </a:spcAft>
+              <a:buClrTx/>
+              <a:buSzTx/>
+              <a:tabLst/>
+            </a:pPr>
+            <a:endParaRPr kumimoji="0" lang="es-ES" altLang="es-ES" sz="1900" b="0" i="0" u="none" strike="noStrike" cap="none" normalizeH="0" baseline="0" dirty="0">
+              <a:ln>
+                <a:noFill/>
+              </a:ln>
+              <a:solidFill>
+                <a:schemeClr val="tx1"/>
+              </a:solidFill>
+              <a:effectLst/>
+            </a:endParaRPr>
+          </a:p>
+          <a:p>
+            <a:pPr marL="285750" marR="0" lvl="0" indent="-285750" defTabSz="914400" rtl="0" eaLnBrk="0" fontAlgn="base" latinLnBrk="0" hangingPunct="0">
+              <a:lnSpc>
+                <a:spcPct val="100000"/>
+              </a:lnSpc>
+              <a:spcBef>
+                <a:spcPct val="0"/>
+              </a:spcBef>
+              <a:spcAft>
+                <a:spcPct val="0"/>
+              </a:spcAft>
+              <a:buClrTx/>
+              <a:buSzTx/>
+              <a:buFont typeface="Arial" panose="020B0604020202020204" pitchFamily="34" charset="0"/>
+              <a:buChar char="•"/>
+              <a:tabLst/>
+            </a:pPr>
+            <a:r>
+              <a:rPr kumimoji="0" lang="es-ES" altLang="es-ES" sz="1900" b="0" i="0" u="none" strike="noStrike" cap="none" normalizeH="0" baseline="0" dirty="0">
+                <a:ln>
+                  <a:noFill/>
+                </a:ln>
+                <a:solidFill>
+                  <a:schemeClr val="tx1"/>
+                </a:solidFill>
+                <a:effectLst/>
+              </a:rPr>
+              <a:t>Seguimiento inadecuado del progreso</a:t>
+            </a:r>
+          </a:p>
+          <a:p>
+            <a:pPr marR="0" lvl="0" algn="ctr" defTabSz="914400" rtl="0" eaLnBrk="0" fontAlgn="base" latinLnBrk="0" hangingPunct="0">
+              <a:lnSpc>
+                <a:spcPct val="100000"/>
+              </a:lnSpc>
+              <a:spcBef>
+                <a:spcPct val="0"/>
+              </a:spcBef>
+              <a:spcAft>
+                <a:spcPct val="0"/>
+              </a:spcAft>
+              <a:buClrTx/>
+              <a:buSzTx/>
+              <a:tabLst/>
+            </a:pPr>
+            <a:endParaRPr kumimoji="0" lang="es-ES" altLang="es-ES" sz="1900" b="0" i="0" u="none" strike="noStrike" cap="none" normalizeH="0" baseline="0" dirty="0">
+              <a:ln>
+                <a:noFill/>
+              </a:ln>
+              <a:solidFill>
+                <a:schemeClr val="tx1"/>
+              </a:solidFill>
+              <a:effectLst/>
+            </a:endParaRPr>
+          </a:p>
+          <a:p>
+            <a:pPr marR="0" lvl="0" algn="ctr" defTabSz="914400" rtl="0" eaLnBrk="0" fontAlgn="base" latinLnBrk="0" hangingPunct="0">
+              <a:lnSpc>
+                <a:spcPct val="100000"/>
+              </a:lnSpc>
+              <a:spcBef>
+                <a:spcPct val="0"/>
+              </a:spcBef>
+              <a:spcAft>
+                <a:spcPct val="0"/>
+              </a:spcAft>
+              <a:buClrTx/>
+              <a:buSzTx/>
+              <a:tabLst/>
+            </a:pPr>
+            <a:r>
+              <a:rPr kumimoji="0" lang="es-ES" altLang="es-ES" sz="1900" b="0" i="1" u="none" strike="noStrike" cap="none" normalizeH="0" baseline="0" dirty="0">
+                <a:ln>
+                  <a:noFill/>
+                </a:ln>
+                <a:solidFill>
+                  <a:schemeClr val="tx1"/>
+                </a:solidFill>
+                <a:effectLst/>
+              </a:rPr>
+              <a:t>“Con este módulo aportamos el valor significativo a las organizaciones </a:t>
+            </a:r>
+            <a:r>
+              <a:rPr kumimoji="0" lang="es-ES" altLang="es-ES" sz="1900" b="1" i="1" u="none" strike="noStrike" cap="none" normalizeH="0" baseline="0" dirty="0">
+                <a:ln>
+                  <a:noFill/>
+                </a:ln>
+                <a:solidFill>
+                  <a:schemeClr val="tx1"/>
+                </a:solidFill>
+                <a:effectLst/>
+              </a:rPr>
+              <a:t>a través de la mejora en la eficiencia operativa con un mayor de control y visibilidad gracias a los dashboards en tiempo real para que los equipos puedan realizar un seguimiento detallado de proyectos para mejorar en la toma de decisiones.”</a:t>
+            </a:r>
+          </a:p>
+          <a:p>
+            <a:pPr algn="ctr"/>
+            <a:r>
+              <a:rPr kumimoji="0" lang="es-ES" altLang="es-ES" sz="2000" b="0" i="0" u="none" strike="noStrike" cap="none" normalizeH="0" baseline="0" dirty="0">
+                <a:ln>
+                  <a:noFill/>
+                </a:ln>
+                <a:solidFill>
+                  <a:schemeClr val="tx1"/>
+                </a:solidFill>
+                <a:effectLst/>
+              </a:rPr>
+              <a:t> </a:t>
+            </a:r>
+          </a:p>
+          <a:p>
+            <a:pPr algn="ctr"/>
+            <a:endParaRPr lang="es-ES" altLang="es-ES" dirty="0"/>
+          </a:p>
+          <a:p>
+            <a:pPr algn="ctr"/>
+            <a:endParaRPr kumimoji="0" lang="es-ES" altLang="es-ES" sz="1800" b="0" i="0" u="none" strike="noStrike" cap="none" normalizeH="0" baseline="0" dirty="0">
+              <a:ln>
+                <a:noFill/>
+              </a:ln>
+              <a:solidFill>
+                <a:schemeClr val="tx1"/>
+              </a:solidFill>
+              <a:effectLst/>
+            </a:endParaRPr>
           </a:p>
         </p:txBody>
       </p:sp>
@@ -4542,7 +4839,7 @@
               <a:buNone/>
             </a:pPr>
             <a:r>
-              <a:rPr kumimoji="0" lang="es-ES" altLang="es-ES" sz="1800" b="0" i="0" u="none" strike="noStrike" cap="none" normalizeH="0" baseline="0" dirty="0">
+              <a:rPr kumimoji="0" lang="es-ES" altLang="es-ES" sz="2400" b="0" i="0" u="none" strike="noStrike" cap="none" normalizeH="0" baseline="0" dirty="0">
                 <a:ln>
                   <a:noFill/>
                 </a:ln>
@@ -4550,6 +4847,7 @@
                   <a:schemeClr val="tx1"/>
                 </a:solidFill>
                 <a:effectLst/>
+                <a:latin typeface="+mj-lt"/>
               </a:rPr>
               <a:t>Visión general de la arquitectura del módulo </a:t>
             </a:r>
@@ -4585,14 +4883,16 @@
           </a:xfrm>
         </p:spPr>
         <p:txBody>
-          <a:bodyPr/>
+          <a:bodyPr>
+            <a:normAutofit/>
+          </a:bodyPr>
           <a:lstStyle/>
           <a:p>
             <a:pPr marL="0" indent="0" algn="ctr">
               <a:buNone/>
             </a:pPr>
             <a:r>
-              <a:rPr kumimoji="0" lang="es-ES" altLang="es-ES" sz="1800" b="0" i="0" u="none" strike="noStrike" cap="none" normalizeH="0" baseline="0" dirty="0">
+              <a:rPr kumimoji="0" lang="es-ES" altLang="es-ES" sz="2400" b="0" i="0" u="none" strike="noStrike" cap="none" normalizeH="0" baseline="0" dirty="0">
                 <a:ln>
                   <a:noFill/>
                 </a:ln>
@@ -4600,10 +4900,196 @@
                   <a:schemeClr val="tx1"/>
                 </a:solidFill>
                 <a:effectLst/>
+                <a:latin typeface="+mj-lt"/>
               </a:rPr>
               <a:t>Principales componentes y cómo interactúan</a:t>
             </a:r>
-            <a:endParaRPr lang="es-ES" dirty="0"/>
+          </a:p>
+          <a:p>
+            <a:pPr marL="0" indent="0">
+              <a:lnSpc>
+                <a:spcPct val="107000"/>
+              </a:lnSpc>
+              <a:spcAft>
+                <a:spcPts val="800"/>
+              </a:spcAft>
+              <a:buSzPts val="1000"/>
+              <a:buNone/>
+              <a:tabLst>
+                <a:tab pos="457200" algn="l"/>
+              </a:tabLst>
+            </a:pPr>
+            <a:r>
+              <a:rPr lang="es-ES" sz="1800" dirty="0">
+                <a:effectLst/>
+                <a:latin typeface="Times New Roman" panose="02020603050405020304" pitchFamily="18" charset="0"/>
+                <a:ea typeface="Times New Roman" panose="02020603050405020304" pitchFamily="18" charset="0"/>
+                <a:cs typeface="Times New Roman" panose="02020603050405020304" pitchFamily="18" charset="0"/>
+              </a:rPr>
+              <a:t>		        - Equipos                    - Panel de Control</a:t>
+            </a:r>
+            <a:endParaRPr lang="es-ES" sz="1800" dirty="0">
+              <a:effectLst/>
+              <a:latin typeface="Calibri" panose="020F0502020204030204" pitchFamily="34" charset="0"/>
+              <a:ea typeface="Calibri" panose="020F0502020204030204" pitchFamily="34" charset="0"/>
+              <a:cs typeface="Times New Roman" panose="02020603050405020304" pitchFamily="18" charset="0"/>
+            </a:endParaRPr>
+          </a:p>
+          <a:p>
+            <a:pPr marL="0" lvl="0" indent="0">
+              <a:lnSpc>
+                <a:spcPct val="107000"/>
+              </a:lnSpc>
+              <a:spcAft>
+                <a:spcPts val="800"/>
+              </a:spcAft>
+              <a:buSzPts val="1000"/>
+              <a:buNone/>
+              <a:tabLst>
+                <a:tab pos="457200" algn="l"/>
+              </a:tabLst>
+            </a:pPr>
+            <a:r>
+              <a:rPr lang="es-ES" dirty="0">
+                <a:latin typeface="Times New Roman" panose="02020603050405020304" pitchFamily="18" charset="0"/>
+                <a:ea typeface="Times New Roman" panose="02020603050405020304" pitchFamily="18" charset="0"/>
+                <a:cs typeface="Times New Roman" panose="02020603050405020304" pitchFamily="18" charset="0"/>
+              </a:rPr>
+              <a:t>Componentes  - </a:t>
+            </a:r>
+            <a:r>
+              <a:rPr lang="es-ES" sz="1800" dirty="0">
+                <a:effectLst/>
+                <a:latin typeface="Times New Roman" panose="02020603050405020304" pitchFamily="18" charset="0"/>
+                <a:ea typeface="Times New Roman" panose="02020603050405020304" pitchFamily="18" charset="0"/>
+                <a:cs typeface="Times New Roman" panose="02020603050405020304" pitchFamily="18" charset="0"/>
+              </a:rPr>
+              <a:t>Proyectos</a:t>
+            </a:r>
+            <a:endParaRPr lang="es-ES" dirty="0">
+              <a:latin typeface="Calibri" panose="020F0502020204030204" pitchFamily="34" charset="0"/>
+              <a:ea typeface="Calibri" panose="020F0502020204030204" pitchFamily="34" charset="0"/>
+              <a:cs typeface="Times New Roman" panose="02020603050405020304" pitchFamily="18" charset="0"/>
+            </a:endParaRPr>
+          </a:p>
+          <a:p>
+            <a:pPr marL="0" lvl="0" indent="0">
+              <a:lnSpc>
+                <a:spcPct val="107000"/>
+              </a:lnSpc>
+              <a:spcAft>
+                <a:spcPts val="800"/>
+              </a:spcAft>
+              <a:buSzPts val="1000"/>
+              <a:buNone/>
+              <a:tabLst>
+                <a:tab pos="457200" algn="l"/>
+              </a:tabLst>
+            </a:pPr>
+            <a:r>
+              <a:rPr lang="es-ES" sz="1800" dirty="0">
+                <a:effectLst/>
+                <a:latin typeface="Calibri" panose="020F0502020204030204" pitchFamily="34" charset="0"/>
+                <a:ea typeface="Calibri" panose="020F0502020204030204" pitchFamily="34" charset="0"/>
+                <a:cs typeface="Times New Roman" panose="02020603050405020304" pitchFamily="18" charset="0"/>
+              </a:rPr>
+              <a:t>                          - </a:t>
+            </a:r>
+            <a:r>
+              <a:rPr lang="es-ES" sz="1800" dirty="0">
+                <a:effectLst/>
+                <a:ea typeface="Times New Roman" panose="02020603050405020304" pitchFamily="18" charset="0"/>
+                <a:cs typeface="Times New Roman" panose="02020603050405020304" pitchFamily="18" charset="0"/>
+              </a:rPr>
+              <a:t>Empleados</a:t>
+            </a:r>
+            <a:endParaRPr lang="es-ES" sz="1800" dirty="0">
+              <a:effectLst/>
+              <a:ea typeface="Calibri" panose="020F0502020204030204" pitchFamily="34" charset="0"/>
+              <a:cs typeface="Times New Roman" panose="02020603050405020304" pitchFamily="18" charset="0"/>
+            </a:endParaRPr>
+          </a:p>
+          <a:p>
+            <a:pPr marL="0" lvl="0" indent="0">
+              <a:lnSpc>
+                <a:spcPct val="107000"/>
+              </a:lnSpc>
+              <a:spcAft>
+                <a:spcPts val="800"/>
+              </a:spcAft>
+              <a:buSzPts val="1000"/>
+              <a:buNone/>
+              <a:tabLst>
+                <a:tab pos="457200" algn="l"/>
+              </a:tabLst>
+            </a:pPr>
+            <a:r>
+              <a:rPr lang="es-ES" dirty="0">
+                <a:ea typeface="Calibri" panose="020F0502020204030204" pitchFamily="34" charset="0"/>
+                <a:cs typeface="Times New Roman" panose="02020603050405020304" pitchFamily="18" charset="0"/>
+              </a:rPr>
+              <a:t>Interactúan:</a:t>
+            </a:r>
+          </a:p>
+          <a:p>
+            <a:pPr marL="0" lvl="0" indent="0">
+              <a:lnSpc>
+                <a:spcPct val="107000"/>
+              </a:lnSpc>
+              <a:spcAft>
+                <a:spcPts val="800"/>
+              </a:spcAft>
+              <a:buSzPts val="1000"/>
+              <a:buNone/>
+              <a:tabLst>
+                <a:tab pos="457200" algn="l"/>
+              </a:tabLst>
+            </a:pPr>
+            <a:endParaRPr lang="es-ES" sz="2400" dirty="0"/>
+          </a:p>
+        </p:txBody>
+      </p:sp>
+      <p:sp>
+        <p:nvSpPr>
+          <p:cNvPr id="2" name="Abrir llave 1">
+            <a:extLst>
+              <a:ext uri="{FF2B5EF4-FFF2-40B4-BE49-F238E27FC236}">
+                <a16:creationId xmlns:a16="http://schemas.microsoft.com/office/drawing/2014/main" id="{E7767522-1111-430D-9EC6-3705AE397CAE}"/>
+              </a:ext>
+            </a:extLst>
+          </p:cNvPr>
+          <p:cNvSpPr/>
+          <p:nvPr/>
+        </p:nvSpPr>
+        <p:spPr>
+          <a:xfrm>
+            <a:off x="7136765" y="1657349"/>
+            <a:ext cx="45719" cy="1502411"/>
+          </a:xfrm>
+          <a:prstGeom prst="leftBrace">
+            <a:avLst/>
+          </a:prstGeom>
+        </p:spPr>
+        <p:style>
+          <a:lnRef idx="1">
+            <a:schemeClr val="accent1"/>
+          </a:lnRef>
+          <a:fillRef idx="0">
+            <a:schemeClr val="accent1"/>
+          </a:fillRef>
+          <a:effectRef idx="0">
+            <a:schemeClr val="accent1"/>
+          </a:effectRef>
+          <a:fontRef idx="minor">
+            <a:schemeClr val="tx1"/>
+          </a:fontRef>
+        </p:style>
+        <p:txBody>
+          <a:bodyPr rtlCol="0" anchor="ctr"/>
+          <a:lstStyle/>
+          <a:p>
+            <a:pPr algn="ctr"/>
+            <a:endParaRPr lang="es-ES"/>
           </a:p>
         </p:txBody>
       </p:sp>
@@ -4656,7 +5142,7 @@
         <p:spPr>
           <a:xfrm>
             <a:off x="0" y="371475"/>
-            <a:ext cx="10030587" cy="1457325"/>
+            <a:ext cx="6858003" cy="1457325"/>
           </a:xfrm>
         </p:spPr>
         <p:txBody>
@@ -4731,11 +5217,11 @@
           <a:bodyPr/>
           <a:lstStyle/>
           <a:p>
-            <a:pPr marL="0" indent="0" algn="ctr">
+            <a:pPr marL="0" indent="0">
               <a:buNone/>
             </a:pPr>
             <a:r>
-              <a:rPr kumimoji="0" lang="es-ES" altLang="es-ES" sz="1800" b="0" i="0" u="none" strike="noStrike" cap="none" normalizeH="0" baseline="0" dirty="0">
+              <a:rPr kumimoji="0" lang="es-ES" altLang="es-ES" sz="2400" b="0" i="0" u="none" strike="noStrike" cap="none" normalizeH="0" baseline="0" dirty="0">
                 <a:ln>
                   <a:noFill/>
                 </a:ln>
@@ -4743,6 +5229,7 @@
                   <a:schemeClr val="tx1"/>
                 </a:solidFill>
                 <a:effectLst/>
+                <a:latin typeface="+mj-lt"/>
               </a:rPr>
               <a:t>Navegación por el módulo </a:t>
             </a:r>
@@ -4752,53 +5239,189 @@
           </a:p>
         </p:txBody>
       </p:sp>
-      <p:sp>
-        <p:nvSpPr>
-          <p:cNvPr id="4" name="Marcador de contenido 3">
+      <p:graphicFrame>
+        <p:nvGraphicFramePr>
+          <p:cNvPr id="6" name="Tabla 6">
             <a:extLst>
               <a:ext uri="{FF2B5EF4-FFF2-40B4-BE49-F238E27FC236}">
-                <a16:creationId xmlns:a16="http://schemas.microsoft.com/office/drawing/2014/main" id="{E9CAA8F8-93DF-48EF-B17F-D8EF1C899175}"/>
+                <a16:creationId xmlns:a16="http://schemas.microsoft.com/office/drawing/2014/main" id="{BED3EF41-9F4F-48E0-8096-4F16EC86C509}"/>
               </a:ext>
             </a:extLst>
           </p:cNvPr>
-          <p:cNvSpPr>
-            <a:spLocks noGrp="1"/>
-          </p:cNvSpPr>
+          <p:cNvGraphicFramePr>
+            <a:graphicFrameLocks noGrp="1"/>
+          </p:cNvGraphicFramePr>
           <p:nvPr>
             <p:ph sz="half" idx="2"/>
-          </p:nvPr>
-        </p:nvSpPr>
-        <p:spPr>
-          <a:xfrm>
-            <a:off x="5629275" y="828675"/>
-            <a:ext cx="5463539" cy="5657850"/>
-          </a:xfrm>
-        </p:spPr>
-        <p:txBody>
-          <a:bodyPr/>
-          <a:lstStyle/>
-          <a:p>
-            <a:pPr marL="0" indent="0" algn="ctr">
-              <a:buNone/>
-            </a:pPr>
-            <a:r>
-              <a:rPr kumimoji="0" lang="es-ES" altLang="es-ES" sz="1800" i="0" u="none" strike="noStrike" cap="none" normalizeH="0" baseline="0" dirty="0">
-                <a:ln>
-                  <a:noFill/>
-                </a:ln>
-                <a:solidFill>
-                  <a:schemeClr val="tx1"/>
-                </a:solidFill>
-                <a:effectLst/>
-              </a:rPr>
-              <a:t>Gestión de Proyectos, Empleados y Equipos </a:t>
-            </a:r>
-          </a:p>
-          <a:p>
-            <a:endParaRPr lang="es-ES" dirty="0"/>
-          </a:p>
-        </p:txBody>
-      </p:sp>
+            <p:extLst>
+              <p:ext uri="{D42A27DB-BD31-4B8C-83A1-F6EECF244321}">
+                <p14:modId xmlns:p14="http://schemas.microsoft.com/office/powerpoint/2010/main" val="2770142159"/>
+              </p:ext>
+            </p:extLst>
+          </p:nvPr>
+        </p:nvGraphicFramePr>
+        <p:xfrm>
+          <a:off x="4861367" y="828676"/>
+          <a:ext cx="7159183" cy="5764479"/>
+        </p:xfrm>
+        <a:graphic>
+          <a:graphicData uri="http://schemas.openxmlformats.org/drawingml/2006/table">
+            <a:tbl>
+              <a:tblPr firstRow="1" bandRow="1">
+                <a:tableStyleId>{5C22544A-7EE6-4342-B048-85BDC9FD1C3A}</a:tableStyleId>
+              </a:tblPr>
+              <a:tblGrid>
+                <a:gridCol w="2044935">
+                  <a:extLst>
+                    <a:ext uri="{9D8B030D-6E8A-4147-A177-3AD203B41FA5}">
+                      <a16:colId xmlns:a16="http://schemas.microsoft.com/office/drawing/2014/main" val="3161350695"/>
+                    </a:ext>
+                  </a:extLst>
+                </a:gridCol>
+                <a:gridCol w="5114248">
+                  <a:extLst>
+                    <a:ext uri="{9D8B030D-6E8A-4147-A177-3AD203B41FA5}">
+                      <a16:colId xmlns:a16="http://schemas.microsoft.com/office/drawing/2014/main" val="3049154149"/>
+                    </a:ext>
+                  </a:extLst>
+                </a:gridCol>
+              </a:tblGrid>
+              <a:tr h="619175">
+                <a:tc>
+                  <a:txBody>
+                    <a:bodyPr/>
+                    <a:lstStyle/>
+                    <a:p>
+                      <a:r>
+                        <a:rPr lang="es-ES" dirty="0"/>
+                        <a:t>NOMBRE DE LA CLASE</a:t>
+                      </a:r>
+                    </a:p>
+                  </a:txBody>
+                  <a:tcPr/>
+                </a:tc>
+                <a:tc>
+                  <a:txBody>
+                    <a:bodyPr/>
+                    <a:lstStyle/>
+                    <a:p>
+                      <a:r>
+                        <a:rPr lang="es-ES" dirty="0"/>
+                        <a:t>¿COMO GESTIONAMOS CADA CLASE?</a:t>
+                      </a:r>
+                    </a:p>
+                  </a:txBody>
+                  <a:tcPr/>
+                </a:tc>
+                <a:extLst>
+                  <a:ext uri="{0D108BD9-81ED-4DB2-BD59-A6C34878D82A}">
+                    <a16:rowId xmlns:a16="http://schemas.microsoft.com/office/drawing/2014/main" val="1759350543"/>
+                  </a:ext>
+                </a:extLst>
+              </a:tr>
+              <a:tr h="2211339">
+                <a:tc>
+                  <a:txBody>
+                    <a:bodyPr/>
+                    <a:lstStyle/>
+                    <a:p>
+                      <a:r>
+                        <a:rPr lang="es-ES" dirty="0"/>
+                        <a:t>PROYECTO</a:t>
+                      </a:r>
+                    </a:p>
+                  </a:txBody>
+                  <a:tcPr/>
+                </a:tc>
+                <a:tc>
+                  <a:txBody>
+                    <a:bodyPr/>
+                    <a:lstStyle/>
+                    <a:p>
+                      <a:r>
+                        <a:rPr lang="es-ES" sz="1700" dirty="0"/>
+                        <a:t>Gestiona el ciclo completo de proyectos con seguimiento automático del progreso (basado en tareas completadas), estados configurables (planificación, en progreso, finalizado, detenido), presupuestos y recursos asignados. Incluye validaciones de datos estrictas, notificaciones automáticas, y facilita la gestión documental con archivos adjuntos.</a:t>
+                      </a:r>
+                    </a:p>
+                  </a:txBody>
+                  <a:tcPr/>
+                </a:tc>
+                <a:extLst>
+                  <a:ext uri="{0D108BD9-81ED-4DB2-BD59-A6C34878D82A}">
+                    <a16:rowId xmlns:a16="http://schemas.microsoft.com/office/drawing/2014/main" val="3490584316"/>
+                  </a:ext>
+                </a:extLst>
+              </a:tr>
+              <a:tr h="1232442">
+                <a:tc>
+                  <a:txBody>
+                    <a:bodyPr/>
+                    <a:lstStyle/>
+                    <a:p>
+                      <a:r>
+                        <a:rPr lang="es-ES" dirty="0"/>
+                        <a:t>EMPLEADO</a:t>
+                      </a:r>
+                    </a:p>
+                  </a:txBody>
+                  <a:tcPr/>
+                </a:tc>
+                <a:tc>
+                  <a:txBody>
+                    <a:bodyPr/>
+                    <a:lstStyle/>
+                    <a:p>
+                      <a:r>
+                        <a:rPr lang="es-ES" sz="1700" dirty="0"/>
+                        <a:t>Gestiona datos del personal, disponibilidad, asignaciones y horas trabajadas. Incluye validación de DNI y seguimiento de actividad mediante el sistema de correo de Odoo.</a:t>
+                      </a:r>
+                    </a:p>
+                  </a:txBody>
+                  <a:tcPr/>
+                </a:tc>
+                <a:extLst>
+                  <a:ext uri="{0D108BD9-81ED-4DB2-BD59-A6C34878D82A}">
+                    <a16:rowId xmlns:a16="http://schemas.microsoft.com/office/drawing/2014/main" val="2404844867"/>
+                  </a:ext>
+                </a:extLst>
+              </a:tr>
+              <a:tr h="1680618">
+                <a:tc>
+                  <a:txBody>
+                    <a:bodyPr/>
+                    <a:lstStyle/>
+                    <a:p>
+                      <a:r>
+                        <a:rPr lang="es-ES" dirty="0"/>
+                        <a:t>EQUIPO</a:t>
+                      </a:r>
+                    </a:p>
+                  </a:txBody>
+                  <a:tcPr/>
+                </a:tc>
+                <a:tc>
+                  <a:txBody>
+                    <a:bodyPr/>
+                    <a:lstStyle/>
+                    <a:p>
+                      <a:r>
+                        <a:rPr lang="es-ES" sz="1700" dirty="0"/>
+                        <a:t>Organiza grupos de trabajo con responsables asignados, cálculo automático del número de miembros y relaciones bidireccionales con empleados y proyectos, permitiendo visualizar la estructura organizativa para optimizar la asignación de recursos humanos.</a:t>
+                      </a:r>
+                    </a:p>
+                  </a:txBody>
+                  <a:tcPr/>
+                </a:tc>
+                <a:extLst>
+                  <a:ext uri="{0D108BD9-81ED-4DB2-BD59-A6C34878D82A}">
+                    <a16:rowId xmlns:a16="http://schemas.microsoft.com/office/drawing/2014/main" val="639069686"/>
+                  </a:ext>
+                </a:extLst>
+              </a:tr>
+            </a:tbl>
+          </a:graphicData>
+        </a:graphic>
+      </p:graphicFrame>
     </p:spTree>
     <p:extLst>
       <p:ext uri="{BB962C8B-B14F-4D97-AF65-F5344CB8AC3E}">
@@ -4894,7 +5517,7 @@
               <a:buNone/>
             </a:pPr>
             <a:r>
-              <a:rPr kumimoji="0" lang="es-ES" altLang="es-ES" sz="1800" b="0" i="0" u="none" strike="noStrike" cap="none" normalizeH="0" baseline="0" dirty="0">
+              <a:rPr kumimoji="0" lang="es-ES" altLang="es-ES" sz="2400" b="0" i="0" u="none" strike="noStrike" cap="none" normalizeH="0" baseline="0" dirty="0">
                 <a:ln>
                   <a:noFill/>
                 </a:ln>
@@ -4902,6 +5525,7 @@
                   <a:schemeClr val="tx1"/>
                 </a:solidFill>
                 <a:effectLst/>
+                <a:latin typeface="+mj-lt"/>
               </a:rPr>
               <a:t>Funcionalidades clave </a:t>
             </a:r>
@@ -4934,14 +5558,16 @@
           </a:xfrm>
         </p:spPr>
         <p:txBody>
-          <a:bodyPr/>
+          <a:bodyPr>
+            <a:normAutofit/>
+          </a:bodyPr>
           <a:lstStyle/>
           <a:p>
             <a:pPr marL="0" indent="0" algn="ctr">
               <a:buNone/>
             </a:pPr>
             <a:r>
-              <a:rPr kumimoji="0" lang="es-ES" altLang="es-ES" sz="1800" b="0" i="0" u="none" strike="noStrike" cap="none" normalizeH="0" baseline="0" dirty="0">
+              <a:rPr kumimoji="0" lang="es-ES" altLang="es-ES" sz="2400" b="0" i="0" u="none" strike="noStrike" cap="none" normalizeH="0" baseline="0" dirty="0">
                 <a:ln>
                   <a:noFill/>
                 </a:ln>
@@ -4949,10 +5575,13 @@
                   <a:schemeClr val="tx1"/>
                 </a:solidFill>
                 <a:effectLst/>
+                <a:latin typeface="+mj-lt"/>
               </a:rPr>
               <a:t>Visualización de datos</a:t>
             </a:r>
-            <a:endParaRPr lang="es-ES" dirty="0"/>
+            <a:endParaRPr lang="es-ES" sz="2400" dirty="0">
+              <a:latin typeface="+mj-lt"/>
+            </a:endParaRPr>
           </a:p>
         </p:txBody>
       </p:sp>
@@ -5051,6 +5680,123 @@
               <a:buNone/>
             </a:pPr>
             <a:r>
+              <a:rPr kumimoji="0" lang="es-ES" altLang="es-ES" sz="2400" b="0" i="0" u="none" strike="noStrike" cap="none" normalizeH="0" baseline="0" dirty="0">
+                <a:ln>
+                  <a:noFill/>
+                </a:ln>
+                <a:solidFill>
+                  <a:schemeClr val="tx1"/>
+                </a:solidFill>
+                <a:effectLst/>
+                <a:latin typeface="+mj-lt"/>
+              </a:rPr>
+              <a:t>Logros y limitaciones actuales </a:t>
+            </a:r>
+          </a:p>
+          <a:p>
+            <a:endParaRPr lang="es-ES" dirty="0"/>
+          </a:p>
+        </p:txBody>
+      </p:sp>
+      <p:sp>
+        <p:nvSpPr>
+          <p:cNvPr id="4" name="Marcador de contenido 3">
+            <a:extLst>
+              <a:ext uri="{FF2B5EF4-FFF2-40B4-BE49-F238E27FC236}">
+                <a16:creationId xmlns:a16="http://schemas.microsoft.com/office/drawing/2014/main" id="{07BE1081-CB10-4A1F-ADCB-9678AEEBE205}"/>
+              </a:ext>
+            </a:extLst>
+          </p:cNvPr>
+          <p:cNvSpPr>
+            <a:spLocks noGrp="1"/>
+          </p:cNvSpPr>
+          <p:nvPr>
+            <p:ph sz="half" idx="2"/>
+          </p:nvPr>
+        </p:nvSpPr>
+        <p:spPr>
+          <a:xfrm>
+            <a:off x="5562600" y="809624"/>
+            <a:ext cx="5587365" cy="5895975"/>
+          </a:xfrm>
+        </p:spPr>
+        <p:txBody>
+          <a:bodyPr/>
+          <a:lstStyle/>
+          <a:p>
+            <a:pPr marL="0" indent="0" algn="ctr">
+              <a:buNone/>
+            </a:pPr>
+            <a:r>
+              <a:rPr kumimoji="0" lang="es-ES" altLang="es-ES" sz="2400" b="0" i="0" u="none" strike="noStrike" cap="none" normalizeH="0" baseline="0" dirty="0">
+                <a:ln>
+                  <a:noFill/>
+                </a:ln>
+                <a:solidFill>
+                  <a:schemeClr val="tx1"/>
+                </a:solidFill>
+                <a:effectLst/>
+                <a:latin typeface="+mj-lt"/>
+              </a:rPr>
+              <a:t>Propuestas de mejora a futuro</a:t>
+            </a:r>
+          </a:p>
+          <a:p>
+            <a:pPr marL="0" indent="0" algn="ctr">
+              <a:buNone/>
+            </a:pPr>
+            <a:endParaRPr kumimoji="0" lang="es-ES" altLang="es-ES" sz="1800" b="0" i="0" u="none" strike="noStrike" cap="none" normalizeH="0" baseline="0" dirty="0">
+              <a:ln>
+                <a:noFill/>
+              </a:ln>
+              <a:solidFill>
+                <a:schemeClr val="tx1"/>
+              </a:solidFill>
+              <a:effectLst/>
+            </a:endParaRPr>
+          </a:p>
+          <a:p>
+            <a:pPr marL="0" marR="0" lvl="0" indent="0" algn="l" defTabSz="914400" rtl="0" eaLnBrk="0" fontAlgn="base" latinLnBrk="0" hangingPunct="0">
+              <a:lnSpc>
+                <a:spcPct val="100000"/>
+              </a:lnSpc>
+              <a:spcBef>
+                <a:spcPct val="0"/>
+              </a:spcBef>
+              <a:spcAft>
+                <a:spcPct val="0"/>
+              </a:spcAft>
+              <a:buClrTx/>
+              <a:buSzTx/>
+              <a:buFontTx/>
+              <a:buChar char="•"/>
+              <a:tabLst/>
+            </a:pPr>
+            <a:r>
+              <a:rPr kumimoji="0" lang="es-ES" altLang="es-ES" sz="1800" b="1" i="0" u="none" strike="noStrike" cap="none" normalizeH="0" baseline="0" dirty="0">
+                <a:ln>
+                  <a:noFill/>
+                </a:ln>
+                <a:solidFill>
+                  <a:schemeClr val="tx1"/>
+                </a:solidFill>
+                <a:effectLst/>
+              </a:rPr>
+              <a:t>Personalización sin código </a:t>
+            </a:r>
+            <a:r>
+              <a:rPr kumimoji="0" lang="es-ES" altLang="es-ES" sz="1800" i="0" u="none" strike="noStrike" cap="none" normalizeH="0" baseline="0" dirty="0">
+                <a:ln>
+                  <a:noFill/>
+                </a:ln>
+                <a:solidFill>
+                  <a:schemeClr val="tx1"/>
+                </a:solidFill>
+                <a:effectLst/>
+              </a:rPr>
+              <a:t>por la implementación de Odoo Studio para adaptar interfaces y flujos de trabajo sin modificar código</a:t>
+            </a:r>
+            <a:r>
               <a:rPr kumimoji="0" lang="es-ES" altLang="es-ES" sz="1800" b="0" i="0" u="none" strike="noStrike" cap="none" normalizeH="0" baseline="0" dirty="0">
                 <a:ln>
                   <a:noFill/>
@@ -5060,43 +5806,92 @@
                 </a:solidFill>
                 <a:effectLst/>
               </a:rPr>
-              <a:t>Logros y limitaciones actuales </a:t>
-            </a:r>
-          </a:p>
-          <a:p>
-            <a:endParaRPr lang="es-ES" dirty="0"/>
-          </a:p>
-        </p:txBody>
-      </p:sp>
-      <p:sp>
-        <p:nvSpPr>
-          <p:cNvPr id="4" name="Marcador de contenido 3">
-            <a:extLst>
-              <a:ext uri="{FF2B5EF4-FFF2-40B4-BE49-F238E27FC236}">
-                <a16:creationId xmlns:a16="http://schemas.microsoft.com/office/drawing/2014/main" id="{07BE1081-CB10-4A1F-ADCB-9678AEEBE205}"/>
-              </a:ext>
-            </a:extLst>
-          </p:cNvPr>
-          <p:cNvSpPr>
-            <a:spLocks noGrp="1"/>
-          </p:cNvSpPr>
-          <p:nvPr>
-            <p:ph sz="half" idx="2"/>
-          </p:nvPr>
-        </p:nvSpPr>
-        <p:spPr>
-          <a:xfrm>
-            <a:off x="5562600" y="809624"/>
-            <a:ext cx="5587365" cy="5895975"/>
-          </a:xfrm>
-        </p:spPr>
-        <p:txBody>
-          <a:bodyPr/>
-          <a:lstStyle/>
-          <a:p>
-            <a:pPr marL="0" indent="0" algn="ctr">
-              <a:buNone/>
+              <a:t>. </a:t>
+            </a:r>
+          </a:p>
+          <a:p>
+            <a:pPr marL="0" marR="0" lvl="0" indent="0" algn="l" defTabSz="914400" rtl="0" eaLnBrk="0" fontAlgn="base" latinLnBrk="0" hangingPunct="0">
+              <a:lnSpc>
+                <a:spcPct val="100000"/>
+              </a:lnSpc>
+              <a:spcBef>
+                <a:spcPct val="0"/>
+              </a:spcBef>
+              <a:spcAft>
+                <a:spcPct val="0"/>
+              </a:spcAft>
+              <a:buClrTx/>
+              <a:buSzTx/>
+              <a:buFontTx/>
+              <a:buChar char="•"/>
+              <a:tabLst/>
             </a:pPr>
+            <a:r>
+              <a:rPr kumimoji="0" lang="es-ES" altLang="es-ES" sz="1800" b="1" i="0" u="none" strike="noStrike" cap="none" normalizeH="0" baseline="0" dirty="0">
+                <a:ln>
+                  <a:noFill/>
+                </a:ln>
+                <a:solidFill>
+                  <a:schemeClr val="tx1"/>
+                </a:solidFill>
+                <a:effectLst/>
+              </a:rPr>
+              <a:t>Seguridad mejorada </a:t>
+            </a:r>
+            <a:r>
+              <a:rPr kumimoji="0" lang="es-ES" altLang="es-ES" sz="1800" i="0" u="none" strike="noStrike" cap="none" normalizeH="0" baseline="0" dirty="0">
+                <a:ln>
+                  <a:noFill/>
+                </a:ln>
+                <a:solidFill>
+                  <a:schemeClr val="tx1"/>
+                </a:solidFill>
+                <a:effectLst/>
+              </a:rPr>
+              <a:t>con los registros de auditoría para monitorear cambios en la base de datos, mejorando trazabilidad y cumplimiento normativo. </a:t>
+            </a:r>
+          </a:p>
+          <a:p>
+            <a:pPr marL="0" marR="0" lvl="0" indent="0" algn="l" defTabSz="914400" rtl="0" eaLnBrk="0" fontAlgn="base" latinLnBrk="0" hangingPunct="0">
+              <a:lnSpc>
+                <a:spcPct val="100000"/>
+              </a:lnSpc>
+              <a:spcBef>
+                <a:spcPct val="0"/>
+              </a:spcBef>
+              <a:spcAft>
+                <a:spcPct val="0"/>
+              </a:spcAft>
+              <a:buClrTx/>
+              <a:buSzTx/>
+              <a:buFontTx/>
+              <a:buChar char="•"/>
+              <a:tabLst/>
+            </a:pPr>
+            <a:r>
+              <a:rPr kumimoji="0" lang="es-ES" altLang="es-ES" sz="1800" b="1" i="0" u="none" strike="noStrike" cap="none" normalizeH="0" baseline="0" dirty="0">
+                <a:ln>
+                  <a:noFill/>
+                </a:ln>
+                <a:solidFill>
+                  <a:schemeClr val="tx1"/>
+                </a:solidFill>
+                <a:effectLst/>
+              </a:rPr>
+              <a:t>Potenciación con IA </a:t>
+            </a:r>
+            <a:r>
+              <a:rPr kumimoji="0" lang="es-ES" altLang="es-ES" sz="1800" i="0" u="none" strike="noStrike" cap="none" normalizeH="0" baseline="0" dirty="0">
+                <a:ln>
+                  <a:noFill/>
+                </a:ln>
+                <a:solidFill>
+                  <a:schemeClr val="tx1"/>
+                </a:solidFill>
+                <a:effectLst/>
+              </a:rPr>
+              <a:t>para el </a:t>
+            </a:r>
             <a:r>
               <a:rPr kumimoji="0" lang="es-ES" altLang="es-ES" sz="1800" b="0" i="0" u="none" strike="noStrike" cap="none" normalizeH="0" baseline="0" dirty="0">
                 <a:ln>
@@ -5107,7 +5902,135 @@
                 </a:solidFill>
                 <a:effectLst/>
               </a:rPr>
-              <a:t>Propuestas de mejora a futuro</a:t>
+              <a:t>análisis predictivo para CRM/Marketing y chatbots de soporte inteligente. </a:t>
+            </a:r>
+          </a:p>
+          <a:p>
+            <a:pPr marL="0" marR="0" lvl="0" indent="0" algn="l" defTabSz="914400" rtl="0" eaLnBrk="0" fontAlgn="base" latinLnBrk="0" hangingPunct="0">
+              <a:lnSpc>
+                <a:spcPct val="100000"/>
+              </a:lnSpc>
+              <a:spcBef>
+                <a:spcPct val="0"/>
+              </a:spcBef>
+              <a:spcAft>
+                <a:spcPct val="0"/>
+              </a:spcAft>
+              <a:buClrTx/>
+              <a:buSzTx/>
+              <a:buFontTx/>
+              <a:buChar char="•"/>
+              <a:tabLst/>
+            </a:pPr>
+            <a:r>
+              <a:rPr kumimoji="0" lang="es-ES" altLang="es-ES" sz="1800" b="1" i="0" u="none" strike="noStrike" cap="none" normalizeH="0" baseline="0" dirty="0">
+                <a:ln>
+                  <a:noFill/>
+                </a:ln>
+                <a:solidFill>
+                  <a:schemeClr val="tx1"/>
+                </a:solidFill>
+                <a:effectLst/>
+              </a:rPr>
+              <a:t>Rendimiento optimizado</a:t>
+            </a:r>
+            <a:r>
+              <a:rPr lang="es-ES" altLang="es-ES" dirty="0"/>
+              <a:t> </a:t>
+            </a:r>
+            <a:r>
+              <a:rPr kumimoji="0" lang="es-ES" altLang="es-ES" sz="1800" b="0" i="0" u="none" strike="noStrike" cap="none" normalizeH="0" baseline="0" dirty="0">
+                <a:ln>
+                  <a:noFill/>
+                </a:ln>
+                <a:solidFill>
+                  <a:schemeClr val="tx1"/>
+                </a:solidFill>
+                <a:effectLst/>
+              </a:rPr>
+              <a:t>mejorando </a:t>
+            </a:r>
+            <a:r>
+              <a:rPr lang="es-ES" altLang="es-ES" dirty="0"/>
+              <a:t>las </a:t>
+            </a:r>
+            <a:r>
+              <a:rPr kumimoji="0" lang="es-ES" altLang="es-ES" sz="1800" b="0" i="0" u="none" strike="noStrike" cap="none" normalizeH="0" baseline="0" dirty="0">
+                <a:ln>
+                  <a:noFill/>
+                </a:ln>
+                <a:solidFill>
+                  <a:schemeClr val="tx1"/>
+                </a:solidFill>
+                <a:effectLst/>
+              </a:rPr>
+              <a:t>consultas a la bases de datos para soportar múltiples servidores y escalabilidad en la nube. </a:t>
+            </a:r>
+          </a:p>
+          <a:p>
+            <a:pPr marL="0" marR="0" lvl="0" indent="0" algn="l" defTabSz="914400" rtl="0" eaLnBrk="0" fontAlgn="base" latinLnBrk="0" hangingPunct="0">
+              <a:lnSpc>
+                <a:spcPct val="100000"/>
+              </a:lnSpc>
+              <a:spcBef>
+                <a:spcPct val="0"/>
+              </a:spcBef>
+              <a:spcAft>
+                <a:spcPct val="0"/>
+              </a:spcAft>
+              <a:buClrTx/>
+              <a:buSzTx/>
+              <a:buFontTx/>
+              <a:buChar char="•"/>
+              <a:tabLst/>
+            </a:pPr>
+            <a:r>
+              <a:rPr kumimoji="0" lang="es-ES" altLang="es-ES" sz="1800" b="1" i="0" u="none" strike="noStrike" cap="none" normalizeH="0" baseline="0" dirty="0">
+                <a:ln>
+                  <a:noFill/>
+                </a:ln>
+                <a:solidFill>
+                  <a:schemeClr val="tx1"/>
+                </a:solidFill>
+                <a:effectLst/>
+              </a:rPr>
+              <a:t>Integración con BI </a:t>
+            </a:r>
+            <a:r>
+              <a:rPr kumimoji="0" lang="es-ES" altLang="es-ES" sz="1800" b="0" i="0" u="none" strike="noStrike" cap="none" normalizeH="0" baseline="0" dirty="0">
+                <a:ln>
+                  <a:noFill/>
+                </a:ln>
+                <a:solidFill>
+                  <a:schemeClr val="tx1"/>
+                </a:solidFill>
+                <a:effectLst/>
+              </a:rPr>
+              <a:t>con conexión a  herramientas como </a:t>
+            </a:r>
+            <a:r>
+              <a:rPr kumimoji="0" lang="es-ES" altLang="es-ES" sz="1800" b="0" i="0" u="none" strike="noStrike" cap="none" normalizeH="0" baseline="0" dirty="0" err="1">
+                <a:ln>
+                  <a:noFill/>
+                </a:ln>
+                <a:solidFill>
+                  <a:schemeClr val="tx1"/>
+                </a:solidFill>
+                <a:effectLst/>
+              </a:rPr>
+              <a:t>Power</a:t>
+            </a:r>
+            <a:r>
+              <a:rPr kumimoji="0" lang="es-ES" altLang="es-ES" sz="1800" b="0" i="0" u="none" strike="noStrike" cap="none" normalizeH="0" baseline="0" dirty="0">
+                <a:ln>
+                  <a:noFill/>
+                </a:ln>
+                <a:solidFill>
+                  <a:schemeClr val="tx1"/>
+                </a:solidFill>
+                <a:effectLst/>
+              </a:rPr>
+              <a:t> BI y la mejora mas optimas de nuestra API</a:t>
             </a:r>
           </a:p>
           <a:p>

</xml_diff>